<commit_message>
fix typo on slide
</commit_message>
<xml_diff>
--- a/fp.pptx
+++ b/fp.pptx
@@ -242,7 +242,7 @@
           <a:p>
             <a:fld id="{0E711FAB-AA64-4E6E-B985-A733977625EE}" type="datetimeFigureOut">
               <a:rPr lang="ru-RU" smtClean="0"/>
-              <a:t>10.05.2016</a:t>
+              <a:t>11.05.2016</a:t>
             </a:fld>
             <a:endParaRPr lang="ru-RU"/>
           </a:p>
@@ -741,7 +741,7 @@
           <a:p>
             <a:fld id="{DCDCBEE7-9590-4FF6-ADDF-3D4B876C8442}" type="datetimeFigureOut">
               <a:rPr lang="ru-RU" smtClean="0"/>
-              <a:t>10.05.2016</a:t>
+              <a:t>11.05.2016</a:t>
             </a:fld>
             <a:endParaRPr lang="ru-RU"/>
           </a:p>
@@ -942,7 +942,7 @@
           <a:p>
             <a:fld id="{DCDCBEE7-9590-4FF6-ADDF-3D4B876C8442}" type="datetimeFigureOut">
               <a:rPr lang="ru-RU" smtClean="0"/>
-              <a:t>10.05.2016</a:t>
+              <a:t>11.05.2016</a:t>
             </a:fld>
             <a:endParaRPr lang="ru-RU"/>
           </a:p>
@@ -1146,7 +1146,7 @@
           <a:p>
             <a:fld id="{DCDCBEE7-9590-4FF6-ADDF-3D4B876C8442}" type="datetimeFigureOut">
               <a:rPr lang="ru-RU" smtClean="0"/>
-              <a:t>10.05.2016</a:t>
+              <a:t>11.05.2016</a:t>
             </a:fld>
             <a:endParaRPr lang="ru-RU"/>
           </a:p>
@@ -1340,7 +1340,7 @@
           <a:p>
             <a:fld id="{DCDCBEE7-9590-4FF6-ADDF-3D4B876C8442}" type="datetimeFigureOut">
               <a:rPr lang="ru-RU" smtClean="0"/>
-              <a:t>10.05.2016</a:t>
+              <a:t>11.05.2016</a:t>
             </a:fld>
             <a:endParaRPr lang="ru-RU"/>
           </a:p>
@@ -1615,7 +1615,7 @@
           <a:p>
             <a:fld id="{DCDCBEE7-9590-4FF6-ADDF-3D4B876C8442}" type="datetimeFigureOut">
               <a:rPr lang="ru-RU" smtClean="0"/>
-              <a:t>10.05.2016</a:t>
+              <a:t>11.05.2016</a:t>
             </a:fld>
             <a:endParaRPr lang="ru-RU"/>
           </a:p>
@@ -1871,7 +1871,7 @@
           <a:p>
             <a:fld id="{DCDCBEE7-9590-4FF6-ADDF-3D4B876C8442}" type="datetimeFigureOut">
               <a:rPr lang="ru-RU" smtClean="0"/>
-              <a:t>10.05.2016</a:t>
+              <a:t>11.05.2016</a:t>
             </a:fld>
             <a:endParaRPr lang="ru-RU"/>
           </a:p>
@@ -2262,7 +2262,7 @@
           <a:p>
             <a:fld id="{DCDCBEE7-9590-4FF6-ADDF-3D4B876C8442}" type="datetimeFigureOut">
               <a:rPr lang="ru-RU" smtClean="0"/>
-              <a:t>10.05.2016</a:t>
+              <a:t>11.05.2016</a:t>
             </a:fld>
             <a:endParaRPr lang="ru-RU"/>
           </a:p>
@@ -2404,7 +2404,7 @@
           <a:p>
             <a:fld id="{DCDCBEE7-9590-4FF6-ADDF-3D4B876C8442}" type="datetimeFigureOut">
               <a:rPr lang="ru-RU" smtClean="0"/>
-              <a:t>10.05.2016</a:t>
+              <a:t>11.05.2016</a:t>
             </a:fld>
             <a:endParaRPr lang="ru-RU"/>
           </a:p>
@@ -2523,7 +2523,7 @@
           <a:p>
             <a:fld id="{DCDCBEE7-9590-4FF6-ADDF-3D4B876C8442}" type="datetimeFigureOut">
               <a:rPr lang="ru-RU" smtClean="0"/>
-              <a:t>10.05.2016</a:t>
+              <a:t>11.05.2016</a:t>
             </a:fld>
             <a:endParaRPr lang="ru-RU"/>
           </a:p>
@@ -2824,7 +2824,7 @@
           <a:p>
             <a:fld id="{DCDCBEE7-9590-4FF6-ADDF-3D4B876C8442}" type="datetimeFigureOut">
               <a:rPr lang="ru-RU" smtClean="0"/>
-              <a:t>10.05.2016</a:t>
+              <a:t>11.05.2016</a:t>
             </a:fld>
             <a:endParaRPr lang="ru-RU"/>
           </a:p>
@@ -3105,7 +3105,7 @@
           <a:p>
             <a:fld id="{DCDCBEE7-9590-4FF6-ADDF-3D4B876C8442}" type="datetimeFigureOut">
               <a:rPr lang="ru-RU" smtClean="0"/>
-              <a:t>10.05.2016</a:t>
+              <a:t>11.05.2016</a:t>
             </a:fld>
             <a:endParaRPr lang="ru-RU"/>
           </a:p>
@@ -21719,6 +21719,13 @@
   <p:clrMapOvr>
     <a:masterClrMapping/>
   </p:clrMapOvr>
+  <p:timing>
+    <p:tnLst>
+      <p:par>
+        <p:cTn id="1" dur="indefinite" restart="never" nodeType="tmRoot"/>
+      </p:par>
+    </p:tnLst>
+  </p:timing>
 </p:sld>
 </file>
 
@@ -23429,13 +23436,6 @@
               </a:rPr>
               <a:t>{</a:t>
             </a:r>
-            <a:endParaRPr lang="ru-RU" altLang="ru-RU" sz="2400" dirty="0">
-              <a:solidFill>
-                <a:srgbClr val="000000"/>
-              </a:solidFill>
-              <a:latin typeface="Consolas" panose="020B0609020204030204" pitchFamily="49" charset="0"/>
-              <a:cs typeface="Consolas" panose="020B0609020204030204" pitchFamily="49" charset="0"/>
-            </a:endParaRPr>
           </a:p>
           <a:p>
             <a:pPr marL="0" indent="0">
@@ -23886,7 +23886,7 @@
           <a:bodyPr/>
           <a:lstStyle/>
           <a:p>
-            <a:endParaRPr lang="ru-RU"/>
+            <a:endParaRPr lang="ru-RU" dirty="0"/>
           </a:p>
         </p:txBody>
       </p:sp>
@@ -23900,6 +23900,13 @@
   <p:clrMapOvr>
     <a:masterClrMapping/>
   </p:clrMapOvr>
+  <p:timing>
+    <p:tnLst>
+      <p:par>
+        <p:cTn id="1" dur="indefinite" restart="never" nodeType="tmRoot"/>
+      </p:par>
+    </p:tnLst>
+  </p:timing>
 </p:sld>
 </file>
 
@@ -27288,19 +27295,7 @@
                 </a:highlight>
                 <a:latin typeface="Consolas" panose="020B0609020204030204" pitchFamily="49" charset="0"/>
               </a:rPr>
-              <a:t> Repeat(</a:t>
-            </a:r>
-            <a:r>
-              <a:rPr lang="en-US" sz="2400" dirty="0" err="1">
-                <a:solidFill>
-                  <a:srgbClr val="000000"/>
-                </a:solidFill>
-                <a:highlight>
-                  <a:srgbClr val="FFFFFF"/>
-                </a:highlight>
-                <a:latin typeface="Consolas" panose="020B0609020204030204" pitchFamily="49" charset="0"/>
-              </a:rPr>
-              <a:t>getItem</a:t>
+              <a:t> </a:t>
             </a:r>
             <a:r>
               <a:rPr lang="en-US" sz="2400" dirty="0" smtClean="0">
@@ -27312,7 +27307,19 @@
                 </a:highlight>
                 <a:latin typeface="Consolas" panose="020B0609020204030204" pitchFamily="49" charset="0"/>
               </a:rPr>
-              <a:t>)</a:t>
+              <a:t>Repeat(get)</a:t>
+            </a:r>
+            <a:r>
+              <a:rPr lang="en-US" sz="2400" dirty="0" smtClean="0">
+                <a:solidFill>
+                  <a:srgbClr val="000000"/>
+                </a:solidFill>
+                <a:highlight>
+                  <a:srgbClr val="FFFFFF"/>
+                </a:highlight>
+                <a:latin typeface="Consolas" panose="020B0609020204030204" pitchFamily="49" charset="0"/>
+              </a:rPr>
+              <a:t/>
             </a:r>
             <a:br>
               <a:rPr lang="en-US" sz="2400" dirty="0" smtClean="0">

</xml_diff>